<commit_message>
Corrections to conductance plots
</commit_message>
<xml_diff>
--- a/HighCondRepresentativeModelTests/HighCondModels_PSCCurrents/Plots/SDprox1RepresentativeConductance.pptx
+++ b/HighCondRepresentativeModelTests/HighCondModels_PSCCurrents/Plots/SDprox1RepresentativeConductance.pptx
@@ -106,7 +106,7 @@
   </p:defaultTextStyle>
   <p:extLst>
     <p:ext uri="{EFAFB233-063F-42B5-8137-9DF3F51BA10A}">
-      <p15:sldGuideLst xmlns:p15="http://schemas.microsoft.com/office/powerpoint/2012/main"/>
+      <p15:sldGuideLst xmlns:p15="http://schemas.microsoft.com/office/powerpoint/2012/main" xmlns=""/>
     </p:ext>
   </p:extLst>
 </p:presentation>
@@ -243,7 +243,7 @@
           <a:p>
             <a:fld id="{13B4EEC1-59A0-6147-A616-EE74AE21FFF0}" type="datetimeFigureOut">
               <a:rPr lang="en-US" smtClean="0"/>
-              <a:t>9/18/17</a:t>
+              <a:t>10/5/2017</a:t>
             </a:fld>
             <a:endParaRPr lang="en-US"/>
           </a:p>
@@ -408,7 +408,7 @@
           <a:p>
             <a:fld id="{13B4EEC1-59A0-6147-A616-EE74AE21FFF0}" type="datetimeFigureOut">
               <a:rPr lang="en-US" smtClean="0"/>
-              <a:t>9/18/17</a:t>
+              <a:t>10/5/2017</a:t>
             </a:fld>
             <a:endParaRPr lang="en-US"/>
           </a:p>
@@ -583,7 +583,7 @@
           <a:p>
             <a:fld id="{13B4EEC1-59A0-6147-A616-EE74AE21FFF0}" type="datetimeFigureOut">
               <a:rPr lang="en-US" smtClean="0"/>
-              <a:t>9/18/17</a:t>
+              <a:t>10/5/2017</a:t>
             </a:fld>
             <a:endParaRPr lang="en-US"/>
           </a:p>
@@ -748,7 +748,7 @@
           <a:p>
             <a:fld id="{13B4EEC1-59A0-6147-A616-EE74AE21FFF0}" type="datetimeFigureOut">
               <a:rPr lang="en-US" smtClean="0"/>
-              <a:t>9/18/17</a:t>
+              <a:t>10/5/2017</a:t>
             </a:fld>
             <a:endParaRPr lang="en-US"/>
           </a:p>
@@ -987,7 +987,7 @@
           <a:p>
             <a:fld id="{13B4EEC1-59A0-6147-A616-EE74AE21FFF0}" type="datetimeFigureOut">
               <a:rPr lang="en-US" smtClean="0"/>
-              <a:t>9/18/17</a:t>
+              <a:t>10/5/2017</a:t>
             </a:fld>
             <a:endParaRPr lang="en-US"/>
           </a:p>
@@ -1214,7 +1214,7 @@
           <a:p>
             <a:fld id="{13B4EEC1-59A0-6147-A616-EE74AE21FFF0}" type="datetimeFigureOut">
               <a:rPr lang="en-US" smtClean="0"/>
-              <a:t>9/18/17</a:t>
+              <a:t>10/5/2017</a:t>
             </a:fld>
             <a:endParaRPr lang="en-US"/>
           </a:p>
@@ -1576,7 +1576,7 @@
           <a:p>
             <a:fld id="{13B4EEC1-59A0-6147-A616-EE74AE21FFF0}" type="datetimeFigureOut">
               <a:rPr lang="en-US" smtClean="0"/>
-              <a:t>9/18/17</a:t>
+              <a:t>10/5/2017</a:t>
             </a:fld>
             <a:endParaRPr lang="en-US"/>
           </a:p>
@@ -1689,7 +1689,7 @@
           <a:p>
             <a:fld id="{13B4EEC1-59A0-6147-A616-EE74AE21FFF0}" type="datetimeFigureOut">
               <a:rPr lang="en-US" smtClean="0"/>
-              <a:t>9/18/17</a:t>
+              <a:t>10/5/2017</a:t>
             </a:fld>
             <a:endParaRPr lang="en-US"/>
           </a:p>
@@ -1779,7 +1779,7 @@
           <a:p>
             <a:fld id="{13B4EEC1-59A0-6147-A616-EE74AE21FFF0}" type="datetimeFigureOut">
               <a:rPr lang="en-US" smtClean="0"/>
-              <a:t>9/18/17</a:t>
+              <a:t>10/5/2017</a:t>
             </a:fld>
             <a:endParaRPr lang="en-US"/>
           </a:p>
@@ -2051,7 +2051,7 @@
           <a:p>
             <a:fld id="{13B4EEC1-59A0-6147-A616-EE74AE21FFF0}" type="datetimeFigureOut">
               <a:rPr lang="en-US" smtClean="0"/>
-              <a:t>9/18/17</a:t>
+              <a:t>10/5/2017</a:t>
             </a:fld>
             <a:endParaRPr lang="en-US"/>
           </a:p>
@@ -2303,7 +2303,7 @@
           <a:p>
             <a:fld id="{13B4EEC1-59A0-6147-A616-EE74AE21FFF0}" type="datetimeFigureOut">
               <a:rPr lang="en-US" smtClean="0"/>
-              <a:t>9/18/17</a:t>
+              <a:t>10/5/2017</a:t>
             </a:fld>
             <a:endParaRPr lang="en-US"/>
           </a:p>
@@ -2511,7 +2511,7 @@
           <a:p>
             <a:fld id="{13B4EEC1-59A0-6147-A616-EE74AE21FFF0}" type="datetimeFigureOut">
               <a:rPr lang="en-US" smtClean="0"/>
-              <a:t>9/18/17</a:t>
+              <a:t>10/5/2017</a:t>
             </a:fld>
             <a:endParaRPr lang="en-US"/>
           </a:p>
@@ -3530,6 +3530,1310 @@
           </a:prstGeom>
         </p:spPr>
       </p:pic>
+      <p:sp>
+        <p:nvSpPr>
+          <p:cNvPr id="12" name="Rectangle 11"/>
+          <p:cNvSpPr/>
+          <p:nvPr/>
+        </p:nvSpPr>
+        <p:spPr>
+          <a:xfrm>
+            <a:off x="7409673" y="7647709"/>
+            <a:ext cx="293454" cy="2189018"/>
+          </a:xfrm>
+          <a:prstGeom prst="rect">
+            <a:avLst/>
+          </a:prstGeom>
+          <a:solidFill>
+            <a:schemeClr val="bg1"/>
+          </a:solidFill>
+          <a:ln>
+            <a:solidFill>
+              <a:schemeClr val="bg1"/>
+            </a:solidFill>
+          </a:ln>
+        </p:spPr>
+        <p:style>
+          <a:lnRef idx="2">
+            <a:schemeClr val="accent1">
+              <a:shade val="50000"/>
+            </a:schemeClr>
+          </a:lnRef>
+          <a:fillRef idx="1">
+            <a:schemeClr val="accent1"/>
+          </a:fillRef>
+          <a:effectRef idx="0">
+            <a:schemeClr val="accent1"/>
+          </a:effectRef>
+          <a:fontRef idx="minor">
+            <a:schemeClr val="lt1"/>
+          </a:fontRef>
+        </p:style>
+        <p:txBody>
+          <a:bodyPr rtlCol="0" anchor="ctr"/>
+          <a:lstStyle/>
+          <a:p>
+            <a:pPr algn="ctr"/>
+            <a:endParaRPr lang="en-US"/>
+          </a:p>
+        </p:txBody>
+      </p:sp>
+      <p:sp>
+        <p:nvSpPr>
+          <p:cNvPr id="19" name="Rectangle 18"/>
+          <p:cNvSpPr/>
+          <p:nvPr/>
+        </p:nvSpPr>
+        <p:spPr>
+          <a:xfrm>
+            <a:off x="14433757" y="7657243"/>
+            <a:ext cx="293454" cy="2189018"/>
+          </a:xfrm>
+          <a:prstGeom prst="rect">
+            <a:avLst/>
+          </a:prstGeom>
+          <a:solidFill>
+            <a:schemeClr val="bg1"/>
+          </a:solidFill>
+          <a:ln>
+            <a:solidFill>
+              <a:schemeClr val="bg1"/>
+            </a:solidFill>
+          </a:ln>
+        </p:spPr>
+        <p:style>
+          <a:lnRef idx="2">
+            <a:schemeClr val="accent1">
+              <a:shade val="50000"/>
+            </a:schemeClr>
+          </a:lnRef>
+          <a:fillRef idx="1">
+            <a:schemeClr val="accent1"/>
+          </a:fillRef>
+          <a:effectRef idx="0">
+            <a:schemeClr val="accent1"/>
+          </a:effectRef>
+          <a:fontRef idx="minor">
+            <a:schemeClr val="lt1"/>
+          </a:fontRef>
+        </p:style>
+        <p:txBody>
+          <a:bodyPr rtlCol="0" anchor="ctr"/>
+          <a:lstStyle/>
+          <a:p>
+            <a:pPr algn="ctr"/>
+            <a:endParaRPr lang="en-US" baseline="-25000" dirty="0"/>
+          </a:p>
+        </p:txBody>
+      </p:sp>
+      <p:sp>
+        <p:nvSpPr>
+          <p:cNvPr id="20" name="Rectangle 19"/>
+          <p:cNvSpPr/>
+          <p:nvPr/>
+        </p:nvSpPr>
+        <p:spPr>
+          <a:xfrm>
+            <a:off x="21366013" y="7791237"/>
+            <a:ext cx="293454" cy="2189018"/>
+          </a:xfrm>
+          <a:prstGeom prst="rect">
+            <a:avLst/>
+          </a:prstGeom>
+          <a:solidFill>
+            <a:schemeClr val="bg1"/>
+          </a:solidFill>
+          <a:ln>
+            <a:solidFill>
+              <a:schemeClr val="bg1"/>
+            </a:solidFill>
+          </a:ln>
+        </p:spPr>
+        <p:style>
+          <a:lnRef idx="2">
+            <a:schemeClr val="accent1">
+              <a:shade val="50000"/>
+            </a:schemeClr>
+          </a:lnRef>
+          <a:fillRef idx="1">
+            <a:schemeClr val="accent1"/>
+          </a:fillRef>
+          <a:effectRef idx="0">
+            <a:schemeClr val="accent1"/>
+          </a:effectRef>
+          <a:fontRef idx="minor">
+            <a:schemeClr val="lt1"/>
+          </a:fontRef>
+        </p:style>
+        <p:txBody>
+          <a:bodyPr rtlCol="0" anchor="ctr"/>
+          <a:lstStyle/>
+          <a:p>
+            <a:pPr algn="ctr"/>
+            <a:endParaRPr lang="en-US"/>
+          </a:p>
+        </p:txBody>
+      </p:sp>
+      <p:sp>
+        <p:nvSpPr>
+          <p:cNvPr id="21" name="Rectangle 20"/>
+          <p:cNvSpPr/>
+          <p:nvPr/>
+        </p:nvSpPr>
+        <p:spPr>
+          <a:xfrm>
+            <a:off x="21355478" y="2085277"/>
+            <a:ext cx="293454" cy="2189018"/>
+          </a:xfrm>
+          <a:prstGeom prst="rect">
+            <a:avLst/>
+          </a:prstGeom>
+          <a:solidFill>
+            <a:schemeClr val="bg1"/>
+          </a:solidFill>
+          <a:ln>
+            <a:solidFill>
+              <a:schemeClr val="bg1"/>
+            </a:solidFill>
+          </a:ln>
+        </p:spPr>
+        <p:style>
+          <a:lnRef idx="2">
+            <a:schemeClr val="accent1">
+              <a:shade val="50000"/>
+            </a:schemeClr>
+          </a:lnRef>
+          <a:fillRef idx="1">
+            <a:schemeClr val="accent1"/>
+          </a:fillRef>
+          <a:effectRef idx="0">
+            <a:schemeClr val="accent1"/>
+          </a:effectRef>
+          <a:fontRef idx="minor">
+            <a:schemeClr val="lt1"/>
+          </a:fontRef>
+        </p:style>
+        <p:txBody>
+          <a:bodyPr rtlCol="0" anchor="ctr"/>
+          <a:lstStyle/>
+          <a:p>
+            <a:pPr algn="ctr"/>
+            <a:endParaRPr lang="en-US"/>
+          </a:p>
+        </p:txBody>
+      </p:sp>
+      <p:sp>
+        <p:nvSpPr>
+          <p:cNvPr id="22" name="Rectangle 21"/>
+          <p:cNvSpPr/>
+          <p:nvPr/>
+        </p:nvSpPr>
+        <p:spPr>
+          <a:xfrm>
+            <a:off x="21366013" y="13260383"/>
+            <a:ext cx="293454" cy="2189018"/>
+          </a:xfrm>
+          <a:prstGeom prst="rect">
+            <a:avLst/>
+          </a:prstGeom>
+          <a:solidFill>
+            <a:schemeClr val="bg1"/>
+          </a:solidFill>
+          <a:ln>
+            <a:solidFill>
+              <a:schemeClr val="bg1"/>
+            </a:solidFill>
+          </a:ln>
+        </p:spPr>
+        <p:style>
+          <a:lnRef idx="2">
+            <a:schemeClr val="accent1">
+              <a:shade val="50000"/>
+            </a:schemeClr>
+          </a:lnRef>
+          <a:fillRef idx="1">
+            <a:schemeClr val="accent1"/>
+          </a:fillRef>
+          <a:effectRef idx="0">
+            <a:schemeClr val="accent1"/>
+          </a:effectRef>
+          <a:fontRef idx="minor">
+            <a:schemeClr val="lt1"/>
+          </a:fontRef>
+        </p:style>
+        <p:txBody>
+          <a:bodyPr rtlCol="0" anchor="ctr"/>
+          <a:lstStyle/>
+          <a:p>
+            <a:pPr algn="ctr"/>
+            <a:endParaRPr lang="en-US"/>
+          </a:p>
+        </p:txBody>
+      </p:sp>
+      <p:sp>
+        <p:nvSpPr>
+          <p:cNvPr id="23" name="Rectangle 22"/>
+          <p:cNvSpPr/>
+          <p:nvPr/>
+        </p:nvSpPr>
+        <p:spPr>
+          <a:xfrm>
+            <a:off x="14468987" y="13260383"/>
+            <a:ext cx="293454" cy="2189018"/>
+          </a:xfrm>
+          <a:prstGeom prst="rect">
+            <a:avLst/>
+          </a:prstGeom>
+          <a:solidFill>
+            <a:schemeClr val="bg1"/>
+          </a:solidFill>
+          <a:ln>
+            <a:solidFill>
+              <a:schemeClr val="bg1"/>
+            </a:solidFill>
+          </a:ln>
+        </p:spPr>
+        <p:style>
+          <a:lnRef idx="2">
+            <a:schemeClr val="accent1">
+              <a:shade val="50000"/>
+            </a:schemeClr>
+          </a:lnRef>
+          <a:fillRef idx="1">
+            <a:schemeClr val="accent1"/>
+          </a:fillRef>
+          <a:effectRef idx="0">
+            <a:schemeClr val="accent1"/>
+          </a:effectRef>
+          <a:fontRef idx="minor">
+            <a:schemeClr val="lt1"/>
+          </a:fontRef>
+        </p:style>
+        <p:txBody>
+          <a:bodyPr rtlCol="0" anchor="ctr"/>
+          <a:lstStyle/>
+          <a:p>
+            <a:pPr algn="ctr"/>
+            <a:endParaRPr lang="en-US"/>
+          </a:p>
+        </p:txBody>
+      </p:sp>
+      <p:sp>
+        <p:nvSpPr>
+          <p:cNvPr id="28" name="Rectangle 27"/>
+          <p:cNvSpPr/>
+          <p:nvPr/>
+        </p:nvSpPr>
+        <p:spPr>
+          <a:xfrm>
+            <a:off x="7415346" y="13064440"/>
+            <a:ext cx="293454" cy="2189018"/>
+          </a:xfrm>
+          <a:prstGeom prst="rect">
+            <a:avLst/>
+          </a:prstGeom>
+          <a:solidFill>
+            <a:schemeClr val="bg1"/>
+          </a:solidFill>
+          <a:ln>
+            <a:solidFill>
+              <a:schemeClr val="bg1"/>
+            </a:solidFill>
+          </a:ln>
+        </p:spPr>
+        <p:style>
+          <a:lnRef idx="2">
+            <a:schemeClr val="accent1">
+              <a:shade val="50000"/>
+            </a:schemeClr>
+          </a:lnRef>
+          <a:fillRef idx="1">
+            <a:schemeClr val="accent1"/>
+          </a:fillRef>
+          <a:effectRef idx="0">
+            <a:schemeClr val="accent1"/>
+          </a:effectRef>
+          <a:fontRef idx="minor">
+            <a:schemeClr val="lt1"/>
+          </a:fontRef>
+        </p:style>
+        <p:txBody>
+          <a:bodyPr rtlCol="0" anchor="ctr"/>
+          <a:lstStyle/>
+          <a:p>
+            <a:pPr algn="ctr"/>
+            <a:endParaRPr lang="en-US"/>
+          </a:p>
+        </p:txBody>
+      </p:sp>
+      <p:sp>
+        <p:nvSpPr>
+          <p:cNvPr id="31" name="Rectangle 30"/>
+          <p:cNvSpPr/>
+          <p:nvPr/>
+        </p:nvSpPr>
+        <p:spPr>
+          <a:xfrm>
+            <a:off x="325451" y="13260383"/>
+            <a:ext cx="293454" cy="2189018"/>
+          </a:xfrm>
+          <a:prstGeom prst="rect">
+            <a:avLst/>
+          </a:prstGeom>
+          <a:solidFill>
+            <a:schemeClr val="bg1"/>
+          </a:solidFill>
+          <a:ln>
+            <a:solidFill>
+              <a:schemeClr val="bg1"/>
+            </a:solidFill>
+          </a:ln>
+        </p:spPr>
+        <p:style>
+          <a:lnRef idx="2">
+            <a:schemeClr val="accent1">
+              <a:shade val="50000"/>
+            </a:schemeClr>
+          </a:lnRef>
+          <a:fillRef idx="1">
+            <a:schemeClr val="accent1"/>
+          </a:fillRef>
+          <a:effectRef idx="0">
+            <a:schemeClr val="accent1"/>
+          </a:effectRef>
+          <a:fontRef idx="minor">
+            <a:schemeClr val="lt1"/>
+          </a:fontRef>
+        </p:style>
+        <p:txBody>
+          <a:bodyPr rtlCol="0" anchor="ctr"/>
+          <a:lstStyle/>
+          <a:p>
+            <a:pPr algn="ctr"/>
+            <a:endParaRPr lang="en-US"/>
+          </a:p>
+        </p:txBody>
+      </p:sp>
+      <p:sp>
+        <p:nvSpPr>
+          <p:cNvPr id="32" name="Rectangle 31"/>
+          <p:cNvSpPr/>
+          <p:nvPr/>
+        </p:nvSpPr>
+        <p:spPr>
+          <a:xfrm rot="16200000">
+            <a:off x="-3076816" y="11085577"/>
+            <a:ext cx="6899343" cy="501505"/>
+          </a:xfrm>
+          <a:prstGeom prst="rect">
+            <a:avLst/>
+          </a:prstGeom>
+          <a:solidFill>
+            <a:schemeClr val="bg1"/>
+          </a:solidFill>
+          <a:ln>
+            <a:solidFill>
+              <a:schemeClr val="bg1"/>
+            </a:solidFill>
+          </a:ln>
+        </p:spPr>
+        <p:style>
+          <a:lnRef idx="2">
+            <a:schemeClr val="accent1">
+              <a:shade val="50000"/>
+            </a:schemeClr>
+          </a:lnRef>
+          <a:fillRef idx="1">
+            <a:schemeClr val="accent1"/>
+          </a:fillRef>
+          <a:effectRef idx="0">
+            <a:schemeClr val="accent1"/>
+          </a:effectRef>
+          <a:fontRef idx="minor">
+            <a:schemeClr val="lt1"/>
+          </a:fontRef>
+        </p:style>
+        <p:txBody>
+          <a:bodyPr rtlCol="0" anchor="ctr"/>
+          <a:lstStyle/>
+          <a:p>
+            <a:pPr algn="ctr"/>
+            <a:r>
+              <a:rPr lang="en-US" sz="2800" b="1" dirty="0" smtClean="0">
+                <a:solidFill>
+                  <a:sysClr val="windowText" lastClr="000000"/>
+                </a:solidFill>
+              </a:rPr>
+              <a:t>Conductance (</a:t>
+            </a:r>
+            <a:r>
+              <a:rPr lang="en-US" sz="2800" b="1" dirty="0" err="1" smtClean="0">
+                <a:solidFill>
+                  <a:sysClr val="windowText" lastClr="000000"/>
+                </a:solidFill>
+              </a:rPr>
+              <a:t>nS</a:t>
+            </a:r>
+            <a:r>
+              <a:rPr lang="en-US" sz="2800" b="1" dirty="0" smtClean="0">
+                <a:solidFill>
+                  <a:sysClr val="windowText" lastClr="000000"/>
+                </a:solidFill>
+              </a:rPr>
+              <a:t>)</a:t>
+            </a:r>
+            <a:endParaRPr lang="en-US" sz="2800" b="1" dirty="0">
+              <a:solidFill>
+                <a:sysClr val="windowText" lastClr="000000"/>
+              </a:solidFill>
+            </a:endParaRPr>
+          </a:p>
+        </p:txBody>
+      </p:sp>
+      <p:sp>
+        <p:nvSpPr>
+          <p:cNvPr id="33" name="Rectangle 32"/>
+          <p:cNvSpPr/>
+          <p:nvPr/>
+        </p:nvSpPr>
+        <p:spPr>
+          <a:xfrm>
+            <a:off x="24598386" y="5491839"/>
+            <a:ext cx="974333" cy="238401"/>
+          </a:xfrm>
+          <a:prstGeom prst="rect">
+            <a:avLst/>
+          </a:prstGeom>
+          <a:solidFill>
+            <a:schemeClr val="bg1"/>
+          </a:solidFill>
+          <a:ln>
+            <a:solidFill>
+              <a:schemeClr val="bg1"/>
+            </a:solidFill>
+          </a:ln>
+        </p:spPr>
+        <p:style>
+          <a:lnRef idx="2">
+            <a:schemeClr val="accent1">
+              <a:shade val="50000"/>
+            </a:schemeClr>
+          </a:lnRef>
+          <a:fillRef idx="1">
+            <a:schemeClr val="accent1"/>
+          </a:fillRef>
+          <a:effectRef idx="0">
+            <a:schemeClr val="accent1"/>
+          </a:effectRef>
+          <a:fontRef idx="minor">
+            <a:schemeClr val="lt1"/>
+          </a:fontRef>
+        </p:style>
+        <p:txBody>
+          <a:bodyPr rtlCol="0" anchor="ctr"/>
+          <a:lstStyle/>
+          <a:p>
+            <a:pPr algn="ctr"/>
+            <a:endParaRPr lang="en-US"/>
+          </a:p>
+        </p:txBody>
+      </p:sp>
+      <p:sp>
+        <p:nvSpPr>
+          <p:cNvPr id="34" name="Rectangle 33"/>
+          <p:cNvSpPr/>
+          <p:nvPr/>
+        </p:nvSpPr>
+        <p:spPr>
+          <a:xfrm>
+            <a:off x="24545558" y="11231035"/>
+            <a:ext cx="974333" cy="238401"/>
+          </a:xfrm>
+          <a:prstGeom prst="rect">
+            <a:avLst/>
+          </a:prstGeom>
+          <a:solidFill>
+            <a:schemeClr val="bg1"/>
+          </a:solidFill>
+          <a:ln>
+            <a:solidFill>
+              <a:schemeClr val="bg1"/>
+            </a:solidFill>
+          </a:ln>
+        </p:spPr>
+        <p:style>
+          <a:lnRef idx="2">
+            <a:schemeClr val="accent1">
+              <a:shade val="50000"/>
+            </a:schemeClr>
+          </a:lnRef>
+          <a:fillRef idx="1">
+            <a:schemeClr val="accent1"/>
+          </a:fillRef>
+          <a:effectRef idx="0">
+            <a:schemeClr val="accent1"/>
+          </a:effectRef>
+          <a:fontRef idx="minor">
+            <a:schemeClr val="lt1"/>
+          </a:fontRef>
+        </p:style>
+        <p:txBody>
+          <a:bodyPr rtlCol="0" anchor="ctr"/>
+          <a:lstStyle/>
+          <a:p>
+            <a:pPr algn="ctr"/>
+            <a:endParaRPr lang="en-US"/>
+          </a:p>
+        </p:txBody>
+      </p:sp>
+      <p:sp>
+        <p:nvSpPr>
+          <p:cNvPr id="35" name="Rectangle 34"/>
+          <p:cNvSpPr/>
+          <p:nvPr/>
+        </p:nvSpPr>
+        <p:spPr>
+          <a:xfrm>
+            <a:off x="17550398" y="11217131"/>
+            <a:ext cx="974333" cy="238401"/>
+          </a:xfrm>
+          <a:prstGeom prst="rect">
+            <a:avLst/>
+          </a:prstGeom>
+          <a:solidFill>
+            <a:schemeClr val="bg1"/>
+          </a:solidFill>
+          <a:ln>
+            <a:solidFill>
+              <a:schemeClr val="bg1"/>
+            </a:solidFill>
+          </a:ln>
+        </p:spPr>
+        <p:style>
+          <a:lnRef idx="2">
+            <a:schemeClr val="accent1">
+              <a:shade val="50000"/>
+            </a:schemeClr>
+          </a:lnRef>
+          <a:fillRef idx="1">
+            <a:schemeClr val="accent1"/>
+          </a:fillRef>
+          <a:effectRef idx="0">
+            <a:schemeClr val="accent1"/>
+          </a:effectRef>
+          <a:fontRef idx="minor">
+            <a:schemeClr val="lt1"/>
+          </a:fontRef>
+        </p:style>
+        <p:txBody>
+          <a:bodyPr rtlCol="0" anchor="ctr"/>
+          <a:lstStyle/>
+          <a:p>
+            <a:pPr algn="ctr"/>
+            <a:endParaRPr lang="en-US"/>
+          </a:p>
+        </p:txBody>
+      </p:sp>
+      <p:sp>
+        <p:nvSpPr>
+          <p:cNvPr id="36" name="Rectangle 35"/>
+          <p:cNvSpPr/>
+          <p:nvPr/>
+        </p:nvSpPr>
+        <p:spPr>
+          <a:xfrm>
+            <a:off x="10572815" y="11217130"/>
+            <a:ext cx="974333" cy="238401"/>
+          </a:xfrm>
+          <a:prstGeom prst="rect">
+            <a:avLst/>
+          </a:prstGeom>
+          <a:solidFill>
+            <a:schemeClr val="bg1"/>
+          </a:solidFill>
+          <a:ln>
+            <a:solidFill>
+              <a:schemeClr val="bg1"/>
+            </a:solidFill>
+          </a:ln>
+        </p:spPr>
+        <p:style>
+          <a:lnRef idx="2">
+            <a:schemeClr val="accent1">
+              <a:shade val="50000"/>
+            </a:schemeClr>
+          </a:lnRef>
+          <a:fillRef idx="1">
+            <a:schemeClr val="accent1"/>
+          </a:fillRef>
+          <a:effectRef idx="0">
+            <a:schemeClr val="accent1"/>
+          </a:effectRef>
+          <a:fontRef idx="minor">
+            <a:schemeClr val="lt1"/>
+          </a:fontRef>
+        </p:style>
+        <p:txBody>
+          <a:bodyPr rtlCol="0" anchor="ctr"/>
+          <a:lstStyle/>
+          <a:p>
+            <a:pPr algn="ctr"/>
+            <a:endParaRPr lang="en-US"/>
+          </a:p>
+        </p:txBody>
+      </p:sp>
+      <p:sp>
+        <p:nvSpPr>
+          <p:cNvPr id="37" name="Rectangle 36"/>
+          <p:cNvSpPr/>
+          <p:nvPr/>
+        </p:nvSpPr>
+        <p:spPr>
+          <a:xfrm>
+            <a:off x="24545557" y="16918283"/>
+            <a:ext cx="974333" cy="238401"/>
+          </a:xfrm>
+          <a:prstGeom prst="rect">
+            <a:avLst/>
+          </a:prstGeom>
+          <a:solidFill>
+            <a:schemeClr val="bg1"/>
+          </a:solidFill>
+          <a:ln>
+            <a:solidFill>
+              <a:schemeClr val="bg1"/>
+            </a:solidFill>
+          </a:ln>
+        </p:spPr>
+        <p:style>
+          <a:lnRef idx="2">
+            <a:schemeClr val="accent1">
+              <a:shade val="50000"/>
+            </a:schemeClr>
+          </a:lnRef>
+          <a:fillRef idx="1">
+            <a:schemeClr val="accent1"/>
+          </a:fillRef>
+          <a:effectRef idx="0">
+            <a:schemeClr val="accent1"/>
+          </a:effectRef>
+          <a:fontRef idx="minor">
+            <a:schemeClr val="lt1"/>
+          </a:fontRef>
+        </p:style>
+        <p:txBody>
+          <a:bodyPr rtlCol="0" anchor="ctr"/>
+          <a:lstStyle/>
+          <a:p>
+            <a:pPr algn="ctr"/>
+            <a:endParaRPr lang="en-US"/>
+          </a:p>
+        </p:txBody>
+      </p:sp>
+      <p:sp>
+        <p:nvSpPr>
+          <p:cNvPr id="38" name="Rectangle 37"/>
+          <p:cNvSpPr/>
+          <p:nvPr/>
+        </p:nvSpPr>
+        <p:spPr>
+          <a:xfrm>
+            <a:off x="24546478" y="22292735"/>
+            <a:ext cx="974333" cy="238401"/>
+          </a:xfrm>
+          <a:prstGeom prst="rect">
+            <a:avLst/>
+          </a:prstGeom>
+          <a:solidFill>
+            <a:schemeClr val="bg1"/>
+          </a:solidFill>
+          <a:ln>
+            <a:solidFill>
+              <a:schemeClr val="bg1"/>
+            </a:solidFill>
+          </a:ln>
+        </p:spPr>
+        <p:style>
+          <a:lnRef idx="2">
+            <a:schemeClr val="accent1">
+              <a:shade val="50000"/>
+            </a:schemeClr>
+          </a:lnRef>
+          <a:fillRef idx="1">
+            <a:schemeClr val="accent1"/>
+          </a:fillRef>
+          <a:effectRef idx="0">
+            <a:schemeClr val="accent1"/>
+          </a:effectRef>
+          <a:fontRef idx="minor">
+            <a:schemeClr val="lt1"/>
+          </a:fontRef>
+        </p:style>
+        <p:txBody>
+          <a:bodyPr rtlCol="0" anchor="ctr"/>
+          <a:lstStyle/>
+          <a:p>
+            <a:pPr algn="ctr"/>
+            <a:endParaRPr lang="en-US"/>
+          </a:p>
+        </p:txBody>
+      </p:sp>
+      <p:sp>
+        <p:nvSpPr>
+          <p:cNvPr id="39" name="Rectangle 38"/>
+          <p:cNvSpPr/>
+          <p:nvPr/>
+        </p:nvSpPr>
+        <p:spPr>
+          <a:xfrm>
+            <a:off x="17550398" y="16918282"/>
+            <a:ext cx="974333" cy="238401"/>
+          </a:xfrm>
+          <a:prstGeom prst="rect">
+            <a:avLst/>
+          </a:prstGeom>
+          <a:solidFill>
+            <a:schemeClr val="bg1"/>
+          </a:solidFill>
+          <a:ln>
+            <a:solidFill>
+              <a:schemeClr val="bg1"/>
+            </a:solidFill>
+          </a:ln>
+        </p:spPr>
+        <p:style>
+          <a:lnRef idx="2">
+            <a:schemeClr val="accent1">
+              <a:shade val="50000"/>
+            </a:schemeClr>
+          </a:lnRef>
+          <a:fillRef idx="1">
+            <a:schemeClr val="accent1"/>
+          </a:fillRef>
+          <a:effectRef idx="0">
+            <a:schemeClr val="accent1"/>
+          </a:effectRef>
+          <a:fontRef idx="minor">
+            <a:schemeClr val="lt1"/>
+          </a:fontRef>
+        </p:style>
+        <p:txBody>
+          <a:bodyPr rtlCol="0" anchor="ctr"/>
+          <a:lstStyle/>
+          <a:p>
+            <a:pPr algn="ctr"/>
+            <a:endParaRPr lang="en-US"/>
+          </a:p>
+        </p:txBody>
+      </p:sp>
+      <p:sp>
+        <p:nvSpPr>
+          <p:cNvPr id="40" name="Rectangle 39"/>
+          <p:cNvSpPr/>
+          <p:nvPr/>
+        </p:nvSpPr>
+        <p:spPr>
+          <a:xfrm>
+            <a:off x="10563679" y="16832281"/>
+            <a:ext cx="974333" cy="238401"/>
+          </a:xfrm>
+          <a:prstGeom prst="rect">
+            <a:avLst/>
+          </a:prstGeom>
+          <a:solidFill>
+            <a:schemeClr val="bg1"/>
+          </a:solidFill>
+          <a:ln>
+            <a:solidFill>
+              <a:schemeClr val="bg1"/>
+            </a:solidFill>
+          </a:ln>
+        </p:spPr>
+        <p:style>
+          <a:lnRef idx="2">
+            <a:schemeClr val="accent1">
+              <a:shade val="50000"/>
+            </a:schemeClr>
+          </a:lnRef>
+          <a:fillRef idx="1">
+            <a:schemeClr val="accent1"/>
+          </a:fillRef>
+          <a:effectRef idx="0">
+            <a:schemeClr val="accent1"/>
+          </a:effectRef>
+          <a:fontRef idx="minor">
+            <a:schemeClr val="lt1"/>
+          </a:fontRef>
+        </p:style>
+        <p:txBody>
+          <a:bodyPr rtlCol="0" anchor="ctr"/>
+          <a:lstStyle/>
+          <a:p>
+            <a:pPr algn="ctr"/>
+            <a:endParaRPr lang="en-US"/>
+          </a:p>
+        </p:txBody>
+      </p:sp>
+      <p:sp>
+        <p:nvSpPr>
+          <p:cNvPr id="41" name="Rectangle 40"/>
+          <p:cNvSpPr/>
+          <p:nvPr/>
+        </p:nvSpPr>
+        <p:spPr>
+          <a:xfrm>
+            <a:off x="17550398" y="22299517"/>
+            <a:ext cx="974333" cy="238401"/>
+          </a:xfrm>
+          <a:prstGeom prst="rect">
+            <a:avLst/>
+          </a:prstGeom>
+          <a:solidFill>
+            <a:schemeClr val="bg1"/>
+          </a:solidFill>
+          <a:ln>
+            <a:solidFill>
+              <a:schemeClr val="bg1"/>
+            </a:solidFill>
+          </a:ln>
+        </p:spPr>
+        <p:style>
+          <a:lnRef idx="2">
+            <a:schemeClr val="accent1">
+              <a:shade val="50000"/>
+            </a:schemeClr>
+          </a:lnRef>
+          <a:fillRef idx="1">
+            <a:schemeClr val="accent1"/>
+          </a:fillRef>
+          <a:effectRef idx="0">
+            <a:schemeClr val="accent1"/>
+          </a:effectRef>
+          <a:fontRef idx="minor">
+            <a:schemeClr val="lt1"/>
+          </a:fontRef>
+        </p:style>
+        <p:txBody>
+          <a:bodyPr rtlCol="0" anchor="ctr"/>
+          <a:lstStyle/>
+          <a:p>
+            <a:pPr algn="ctr"/>
+            <a:endParaRPr lang="en-US"/>
+          </a:p>
+        </p:txBody>
+      </p:sp>
+      <p:sp>
+        <p:nvSpPr>
+          <p:cNvPr id="42" name="Rectangle 41"/>
+          <p:cNvSpPr/>
+          <p:nvPr/>
+        </p:nvSpPr>
+        <p:spPr>
+          <a:xfrm>
+            <a:off x="10434548" y="22323900"/>
+            <a:ext cx="974333" cy="238401"/>
+          </a:xfrm>
+          <a:prstGeom prst="rect">
+            <a:avLst/>
+          </a:prstGeom>
+          <a:solidFill>
+            <a:schemeClr val="bg1"/>
+          </a:solidFill>
+          <a:ln>
+            <a:solidFill>
+              <a:schemeClr val="bg1"/>
+            </a:solidFill>
+          </a:ln>
+        </p:spPr>
+        <p:style>
+          <a:lnRef idx="2">
+            <a:schemeClr val="accent1">
+              <a:shade val="50000"/>
+            </a:schemeClr>
+          </a:lnRef>
+          <a:fillRef idx="1">
+            <a:schemeClr val="accent1"/>
+          </a:fillRef>
+          <a:effectRef idx="0">
+            <a:schemeClr val="accent1"/>
+          </a:effectRef>
+          <a:fontRef idx="minor">
+            <a:schemeClr val="lt1"/>
+          </a:fontRef>
+        </p:style>
+        <p:txBody>
+          <a:bodyPr rtlCol="0" anchor="ctr"/>
+          <a:lstStyle/>
+          <a:p>
+            <a:pPr algn="ctr"/>
+            <a:endParaRPr lang="en-US"/>
+          </a:p>
+        </p:txBody>
+      </p:sp>
+      <p:sp>
+        <p:nvSpPr>
+          <p:cNvPr id="43" name="Rectangle 42"/>
+          <p:cNvSpPr/>
+          <p:nvPr/>
+        </p:nvSpPr>
+        <p:spPr>
+          <a:xfrm>
+            <a:off x="3570895" y="16880181"/>
+            <a:ext cx="974333" cy="238401"/>
+          </a:xfrm>
+          <a:prstGeom prst="rect">
+            <a:avLst/>
+          </a:prstGeom>
+          <a:solidFill>
+            <a:schemeClr val="bg1"/>
+          </a:solidFill>
+          <a:ln>
+            <a:solidFill>
+              <a:schemeClr val="bg1"/>
+            </a:solidFill>
+          </a:ln>
+        </p:spPr>
+        <p:style>
+          <a:lnRef idx="2">
+            <a:schemeClr val="accent1">
+              <a:shade val="50000"/>
+            </a:schemeClr>
+          </a:lnRef>
+          <a:fillRef idx="1">
+            <a:schemeClr val="accent1"/>
+          </a:fillRef>
+          <a:effectRef idx="0">
+            <a:schemeClr val="accent1"/>
+          </a:effectRef>
+          <a:fontRef idx="minor">
+            <a:schemeClr val="lt1"/>
+          </a:fontRef>
+        </p:style>
+        <p:txBody>
+          <a:bodyPr rtlCol="0" anchor="ctr"/>
+          <a:lstStyle/>
+          <a:p>
+            <a:pPr algn="ctr"/>
+            <a:endParaRPr lang="en-US"/>
+          </a:p>
+        </p:txBody>
+      </p:sp>
+      <p:sp>
+        <p:nvSpPr>
+          <p:cNvPr id="44" name="Rectangle 43"/>
+          <p:cNvSpPr/>
+          <p:nvPr/>
+        </p:nvSpPr>
+        <p:spPr>
+          <a:xfrm>
+            <a:off x="3570894" y="22323900"/>
+            <a:ext cx="974333" cy="238401"/>
+          </a:xfrm>
+          <a:prstGeom prst="rect">
+            <a:avLst/>
+          </a:prstGeom>
+          <a:solidFill>
+            <a:schemeClr val="bg1"/>
+          </a:solidFill>
+          <a:ln>
+            <a:solidFill>
+              <a:schemeClr val="bg1"/>
+            </a:solidFill>
+          </a:ln>
+        </p:spPr>
+        <p:style>
+          <a:lnRef idx="2">
+            <a:schemeClr val="accent1">
+              <a:shade val="50000"/>
+            </a:schemeClr>
+          </a:lnRef>
+          <a:fillRef idx="1">
+            <a:schemeClr val="accent1"/>
+          </a:fillRef>
+          <a:effectRef idx="0">
+            <a:schemeClr val="accent1"/>
+          </a:effectRef>
+          <a:fontRef idx="minor">
+            <a:schemeClr val="lt1"/>
+          </a:fontRef>
+        </p:style>
+        <p:txBody>
+          <a:bodyPr rtlCol="0" anchor="ctr"/>
+          <a:lstStyle/>
+          <a:p>
+            <a:pPr algn="ctr"/>
+            <a:endParaRPr lang="en-US"/>
+          </a:p>
+        </p:txBody>
+      </p:sp>
+      <p:sp>
+        <p:nvSpPr>
+          <p:cNvPr id="45" name="Rectangle 44"/>
+          <p:cNvSpPr/>
+          <p:nvPr/>
+        </p:nvSpPr>
+        <p:spPr>
+          <a:xfrm>
+            <a:off x="12278625" y="22362000"/>
+            <a:ext cx="4603718" cy="563088"/>
+          </a:xfrm>
+          <a:prstGeom prst="rect">
+            <a:avLst/>
+          </a:prstGeom>
+          <a:solidFill>
+            <a:schemeClr val="bg1"/>
+          </a:solidFill>
+          <a:ln>
+            <a:solidFill>
+              <a:schemeClr val="bg1"/>
+            </a:solidFill>
+          </a:ln>
+        </p:spPr>
+        <p:style>
+          <a:lnRef idx="2">
+            <a:schemeClr val="accent1">
+              <a:shade val="50000"/>
+            </a:schemeClr>
+          </a:lnRef>
+          <a:fillRef idx="1">
+            <a:schemeClr val="accent1"/>
+          </a:fillRef>
+          <a:effectRef idx="0">
+            <a:schemeClr val="accent1"/>
+          </a:effectRef>
+          <a:fontRef idx="minor">
+            <a:schemeClr val="lt1"/>
+          </a:fontRef>
+        </p:style>
+        <p:txBody>
+          <a:bodyPr rtlCol="0" anchor="ctr"/>
+          <a:lstStyle/>
+          <a:p>
+            <a:pPr algn="ctr"/>
+            <a:r>
+              <a:rPr lang="en-US" sz="2800" b="1" dirty="0" smtClean="0">
+                <a:solidFill>
+                  <a:sysClr val="windowText" lastClr="000000"/>
+                </a:solidFill>
+              </a:rPr>
+              <a:t>Time (</a:t>
+            </a:r>
+            <a:r>
+              <a:rPr lang="en-US" sz="2800" b="1" dirty="0" err="1" smtClean="0">
+                <a:solidFill>
+                  <a:sysClr val="windowText" lastClr="000000"/>
+                </a:solidFill>
+              </a:rPr>
+              <a:t>ms</a:t>
+            </a:r>
+            <a:r>
+              <a:rPr lang="en-US" sz="2800" b="1" dirty="0" smtClean="0">
+                <a:solidFill>
+                  <a:sysClr val="windowText" lastClr="000000"/>
+                </a:solidFill>
+              </a:rPr>
+              <a:t>)</a:t>
+            </a:r>
+            <a:endParaRPr lang="en-US" sz="2800" b="1" dirty="0">
+              <a:solidFill>
+                <a:sysClr val="windowText" lastClr="000000"/>
+              </a:solidFill>
+            </a:endParaRPr>
+          </a:p>
+        </p:txBody>
+      </p:sp>
+      <p:sp>
+        <p:nvSpPr>
+          <p:cNvPr id="46" name="Rectangle 45"/>
+          <p:cNvSpPr/>
+          <p:nvPr/>
+        </p:nvSpPr>
+        <p:spPr>
+          <a:xfrm>
+            <a:off x="21351525" y="18652440"/>
+            <a:ext cx="293454" cy="2189018"/>
+          </a:xfrm>
+          <a:prstGeom prst="rect">
+            <a:avLst/>
+          </a:prstGeom>
+          <a:solidFill>
+            <a:schemeClr val="bg1"/>
+          </a:solidFill>
+          <a:ln>
+            <a:solidFill>
+              <a:schemeClr val="bg1"/>
+            </a:solidFill>
+          </a:ln>
+        </p:spPr>
+        <p:style>
+          <a:lnRef idx="2">
+            <a:schemeClr val="accent1">
+              <a:shade val="50000"/>
+            </a:schemeClr>
+          </a:lnRef>
+          <a:fillRef idx="1">
+            <a:schemeClr val="accent1"/>
+          </a:fillRef>
+          <a:effectRef idx="0">
+            <a:schemeClr val="accent1"/>
+          </a:effectRef>
+          <a:fontRef idx="minor">
+            <a:schemeClr val="lt1"/>
+          </a:fontRef>
+        </p:style>
+        <p:txBody>
+          <a:bodyPr rtlCol="0" anchor="ctr"/>
+          <a:lstStyle/>
+          <a:p>
+            <a:pPr algn="ctr"/>
+            <a:endParaRPr lang="en-US"/>
+          </a:p>
+        </p:txBody>
+      </p:sp>
+      <p:sp>
+        <p:nvSpPr>
+          <p:cNvPr id="47" name="Rectangle 46"/>
+          <p:cNvSpPr/>
+          <p:nvPr/>
+        </p:nvSpPr>
+        <p:spPr>
+          <a:xfrm>
+            <a:off x="14457193" y="18652440"/>
+            <a:ext cx="293454" cy="2189018"/>
+          </a:xfrm>
+          <a:prstGeom prst="rect">
+            <a:avLst/>
+          </a:prstGeom>
+          <a:solidFill>
+            <a:schemeClr val="bg1"/>
+          </a:solidFill>
+          <a:ln>
+            <a:solidFill>
+              <a:schemeClr val="bg1"/>
+            </a:solidFill>
+          </a:ln>
+        </p:spPr>
+        <p:style>
+          <a:lnRef idx="2">
+            <a:schemeClr val="accent1">
+              <a:shade val="50000"/>
+            </a:schemeClr>
+          </a:lnRef>
+          <a:fillRef idx="1">
+            <a:schemeClr val="accent1"/>
+          </a:fillRef>
+          <a:effectRef idx="0">
+            <a:schemeClr val="accent1"/>
+          </a:effectRef>
+          <a:fontRef idx="minor">
+            <a:schemeClr val="lt1"/>
+          </a:fontRef>
+        </p:style>
+        <p:txBody>
+          <a:bodyPr rtlCol="0" anchor="ctr"/>
+          <a:lstStyle/>
+          <a:p>
+            <a:pPr algn="ctr"/>
+            <a:endParaRPr lang="en-US"/>
+          </a:p>
+        </p:txBody>
+      </p:sp>
+      <p:sp>
+        <p:nvSpPr>
+          <p:cNvPr id="48" name="Rectangle 47"/>
+          <p:cNvSpPr/>
+          <p:nvPr/>
+        </p:nvSpPr>
+        <p:spPr>
+          <a:xfrm>
+            <a:off x="7407687" y="18652440"/>
+            <a:ext cx="293454" cy="2189018"/>
+          </a:xfrm>
+          <a:prstGeom prst="rect">
+            <a:avLst/>
+          </a:prstGeom>
+          <a:solidFill>
+            <a:schemeClr val="bg1"/>
+          </a:solidFill>
+          <a:ln>
+            <a:solidFill>
+              <a:schemeClr val="bg1"/>
+            </a:solidFill>
+          </a:ln>
+        </p:spPr>
+        <p:style>
+          <a:lnRef idx="2">
+            <a:schemeClr val="accent1">
+              <a:shade val="50000"/>
+            </a:schemeClr>
+          </a:lnRef>
+          <a:fillRef idx="1">
+            <a:schemeClr val="accent1"/>
+          </a:fillRef>
+          <a:effectRef idx="0">
+            <a:schemeClr val="accent1"/>
+          </a:effectRef>
+          <a:fontRef idx="minor">
+            <a:schemeClr val="lt1"/>
+          </a:fontRef>
+        </p:style>
+        <p:txBody>
+          <a:bodyPr rtlCol="0" anchor="ctr"/>
+          <a:lstStyle/>
+          <a:p>
+            <a:pPr algn="ctr"/>
+            <a:endParaRPr lang="en-US"/>
+          </a:p>
+        </p:txBody>
+      </p:sp>
+      <p:sp>
+        <p:nvSpPr>
+          <p:cNvPr id="49" name="Rectangle 48"/>
+          <p:cNvSpPr/>
+          <p:nvPr/>
+        </p:nvSpPr>
+        <p:spPr>
+          <a:xfrm>
+            <a:off x="335095" y="18652440"/>
+            <a:ext cx="293454" cy="2189018"/>
+          </a:xfrm>
+          <a:prstGeom prst="rect">
+            <a:avLst/>
+          </a:prstGeom>
+          <a:solidFill>
+            <a:schemeClr val="bg1"/>
+          </a:solidFill>
+          <a:ln>
+            <a:solidFill>
+              <a:schemeClr val="bg1"/>
+            </a:solidFill>
+          </a:ln>
+        </p:spPr>
+        <p:style>
+          <a:lnRef idx="2">
+            <a:schemeClr val="accent1">
+              <a:shade val="50000"/>
+            </a:schemeClr>
+          </a:lnRef>
+          <a:fillRef idx="1">
+            <a:schemeClr val="accent1"/>
+          </a:fillRef>
+          <a:effectRef idx="0">
+            <a:schemeClr val="accent1"/>
+          </a:effectRef>
+          <a:fontRef idx="minor">
+            <a:schemeClr val="lt1"/>
+          </a:fontRef>
+        </p:style>
+        <p:txBody>
+          <a:bodyPr rtlCol="0" anchor="ctr"/>
+          <a:lstStyle/>
+          <a:p>
+            <a:pPr algn="ctr"/>
+            <a:endParaRPr lang="en-US"/>
+          </a:p>
+        </p:txBody>
+      </p:sp>
     </p:spTree>
     <p:extLst>
       <p:ext uri="{BB962C8B-B14F-4D97-AF65-F5344CB8AC3E}">
@@ -3798,7 +5102,7 @@
   <a:extraClrSchemeLst/>
   <a:extLst>
     <a:ext uri="{05A4C25C-085E-4340-85A3-A5531E510DB2}">
-      <thm15:themeFamily xmlns:thm15="http://schemas.microsoft.com/office/thememl/2012/main" name="Office Theme" id="{62F939B6-93AF-4DB8-9C6B-D6C7DFDC589F}" vid="{4A3C46E8-61CC-4603-A589-7422A47A8E4A}"/>
+      <thm15:themeFamily xmlns:thm15="http://schemas.microsoft.com/office/thememl/2012/main" xmlns="" name="Office Theme" id="{62F939B6-93AF-4DB8-9C6B-D6C7DFDC589F}" vid="{4A3C46E8-61CC-4603-A589-7422A47A8E4A}"/>
     </a:ext>
   </a:extLst>
 </a:theme>

</xml_diff>